<commit_message>
Updates lets section for style
</commit_message>
<xml_diff>
--- a/03-let.pptx
+++ b/03-let.pptx
@@ -160,7 +160,7 @@
   </p:defaultTextStyle>
   <p:extLst>
     <p:ext uri="{EFAFB233-063F-42B5-8137-9DF3F51BA10A}">
-      <p15:sldGuideLst xmlns:p15="http://schemas.microsoft.com/office/powerpoint/2012/main" xmlns="">
+      <p15:sldGuideLst xmlns="" xmlns:p15="http://schemas.microsoft.com/office/powerpoint/2012/main">
         <p15:guide id="1" orient="horz" pos="894">
           <p15:clr>
             <a:srgbClr val="A4A3A4"/>
@@ -174,7 +174,7 @@
       </p15:sldGuideLst>
     </p:ext>
     <p:ext uri="{2D200454-40CA-4A62-9FC3-DE9A4176ACB9}">
-      <p15:notesGuideLst xmlns:p15="http://schemas.microsoft.com/office/powerpoint/2012/main" xmlns=""/>
+      <p15:notesGuideLst xmlns="" xmlns:p15="http://schemas.microsoft.com/office/powerpoint/2012/main"/>
     </p:ext>
   </p:extLst>
 </p:presentation>
@@ -11737,29 +11737,18 @@
                 <a:ea typeface="Apple Chancery" charset="0"/>
                 <a:cs typeface="Apple Chancery" charset="0"/>
               </a:rPr>
-              <a:t>Refactor</a:t>
+              <a:t>Refactor. Execute the Tests.</a:t>
             </a:r>
           </a:p>
           <a:p>
             <a:pPr algn="ctr"/>
             <a:r>
-              <a:rPr lang="en-US" sz="6000" dirty="0" smtClean="0">
+              <a:rPr lang="en-US" sz="6000" smtClean="0">
                 <a:latin typeface="Apple Chancery" charset="0"/>
                 <a:ea typeface="Apple Chancery" charset="0"/>
                 <a:cs typeface="Apple Chancery" charset="0"/>
               </a:rPr>
-              <a:t>Execute the Tests</a:t>
-            </a:r>
-          </a:p>
-          <a:p>
-            <a:pPr algn="ctr"/>
-            <a:r>
-              <a:rPr lang="en-US" sz="6000" dirty="0" smtClean="0">
-                <a:latin typeface="Apple Chancery" charset="0"/>
-                <a:ea typeface="Apple Chancery" charset="0"/>
-                <a:cs typeface="Apple Chancery" charset="0"/>
-              </a:rPr>
-              <a:t>Find Success</a:t>
+              <a:t>Find Success.</a:t>
             </a:r>
             <a:endParaRPr lang="en-US" sz="6000" dirty="0">
               <a:latin typeface="Apple Chancery" charset="0"/>
@@ -12888,10 +12877,16 @@
           <a:lstStyle/>
           <a:p>
             <a:r>
-              <a:rPr lang="en-US" dirty="0" smtClean="0"/>
+              <a:rPr lang="en-US" dirty="0" smtClean="0">
+                <a:latin typeface="Courier New"/>
+                <a:cs typeface="Courier New"/>
+              </a:rPr>
               <a:t>let</a:t>
             </a:r>
-            <a:endParaRPr lang="en-US" dirty="0"/>
+            <a:endParaRPr lang="en-US" dirty="0">
+              <a:latin typeface="Courier New"/>
+              <a:cs typeface="Courier New"/>
+            </a:endParaRPr>
           </a:p>
         </p:txBody>
       </p:sp>
@@ -12912,35 +12907,70 @@
           <a:p>
             <a:r>
               <a:rPr lang="en-US" dirty="0"/>
-              <a:t>Use let to define a memoized helper method. The value will be cached</a:t>
-            </a:r>
-          </a:p>
-          <a:p>
+              <a:t>Use let to define a memoized helper method. </a:t>
+            </a:r>
+            <a:endParaRPr lang="en-US" dirty="0" smtClean="0"/>
+          </a:p>
+          <a:p>
+            <a:endParaRPr lang="en-US" dirty="0"/>
+          </a:p>
+          <a:p>
+            <a:r>
+              <a:rPr lang="en-US" dirty="0" smtClean="0"/>
+              <a:t>The </a:t>
+            </a:r>
             <a:r>
               <a:rPr lang="en-US" dirty="0"/>
-              <a:t>across multiple calls in the same example but not across examples.</a:t>
-            </a:r>
-          </a:p>
-          <a:p>
+              <a:t>value will be </a:t>
+            </a:r>
+            <a:r>
+              <a:rPr lang="en-US" dirty="0" smtClean="0"/>
+              <a:t>cached across </a:t>
+            </a:r>
+            <a:r>
+              <a:rPr lang="en-US" dirty="0"/>
+              <a:t>multiple calls in the same example but not across </a:t>
+            </a:r>
+            <a:r>
+              <a:rPr lang="en-US" dirty="0" smtClean="0"/>
+              <a:t>examples. It is also lazy</a:t>
+            </a:r>
+            <a:r>
+              <a:rPr lang="en-US" dirty="0"/>
+              <a:t>-evaluated: it is not evaluated until the first </a:t>
+            </a:r>
+            <a:r>
+              <a:rPr lang="en-US" dirty="0" smtClean="0"/>
+              <a:t>time the </a:t>
+            </a:r>
+            <a:r>
+              <a:rPr lang="en-US" dirty="0"/>
+              <a:t>method it defines is </a:t>
+            </a:r>
+            <a:r>
+              <a:rPr lang="en-US" dirty="0" smtClean="0"/>
+              <a:t>invoked. See </a:t>
+            </a:r>
+            <a:r>
+              <a:rPr lang="en-US" b="1" dirty="0" smtClean="0">
+                <a:latin typeface="Courier New"/>
+                <a:cs typeface="Courier New"/>
+              </a:rPr>
+              <a:t>let!</a:t>
+            </a:r>
+            <a:r>
+              <a:rPr lang="en-US" dirty="0" smtClean="0"/>
+              <a:t> if you want to </a:t>
+            </a:r>
+            <a:r>
+              <a:rPr lang="en-US" dirty="0" smtClean="0"/>
+              <a:t>force the invocation </a:t>
+            </a:r>
+            <a:r>
+              <a:rPr lang="en-US" dirty="0" smtClean="0"/>
+              <a:t>before each example.</a:t>
+            </a:r>
             <a:endParaRPr lang="en-US" dirty="0"/>
-          </a:p>
-          <a:p>
-            <a:r>
-              <a:rPr lang="en-US" i="1" dirty="0"/>
-              <a:t>Note that let is lazy-evaluated: it is not evaluated until the first time</a:t>
-            </a:r>
-          </a:p>
-          <a:p>
-            <a:r>
-              <a:rPr lang="en-US" i="1" dirty="0"/>
-              <a:t>the method it defines is invoked. You can use let! to force the method's</a:t>
-            </a:r>
-          </a:p>
-          <a:p>
-            <a:r>
-              <a:rPr lang="en-US" i="1" dirty="0"/>
-              <a:t>invocation before each example.</a:t>
-            </a:r>
           </a:p>
         </p:txBody>
       </p:sp>
@@ -17278,7 +17308,7 @@
   <a:extraClrSchemeLst/>
   <a:extLst>
     <a:ext uri="{05A4C25C-085E-4340-85A3-A5531E510DB2}">
-      <thm15:themeFamily xmlns:thm15="http://schemas.microsoft.com/office/thememl/2012/main" xmlns="" name="Chef-TemplateComps_v09-16x9-Light.potx" id="{078CEFDB-FA7A-4E36-9964-13EF367585CB}" vid="{8B87B0F3-7308-43D5-8388-E1B49EA02652}"/>
+      <thm15:themeFamily xmlns="" xmlns:thm15="http://schemas.microsoft.com/office/thememl/2012/main" name="Chef-TemplateComps_v09-16x9-Light.potx" id="{078CEFDB-FA7A-4E36-9964-13EF367585CB}" vid="{8B87B0F3-7308-43D5-8388-E1B49EA02652}"/>
     </a:ext>
   </a:extLst>
 </a:theme>
@@ -17660,7 +17690,7 @@
   <a:extraClrSchemeLst/>
   <a:extLst>
     <a:ext uri="{05A4C25C-085E-4340-85A3-A5531E510DB2}">
-      <thm15:themeFamily xmlns:thm15="http://schemas.microsoft.com/office/thememl/2012/main" xmlns="" name="Chef-TemplateComps_v09-16x9-Light.potx" id="{078CEFDB-FA7A-4E36-9964-13EF367585CB}" vid="{8B87B0F3-7308-43D5-8388-E1B49EA02652}"/>
+      <thm15:themeFamily xmlns="" xmlns:thm15="http://schemas.microsoft.com/office/thememl/2012/main" name="Chef-TemplateComps_v09-16x9-Light.potx" id="{078CEFDB-FA7A-4E36-9964-13EF367585CB}" vid="{8B87B0F3-7308-43D5-8388-E1B49EA02652}"/>
     </a:ext>
   </a:extLst>
 </a:theme>

</xml_diff>